<commit_message>
ACTUALIZACION DE PPT S1
</commit_message>
<xml_diff>
--- a/ tsp01-contratos-clientes/ITERACCION01/SI01/PRESENTACIONES/PPT SI01 MCUN.pptx
+++ b/ tsp01-contratos-clientes/ITERACCION01/SI01/PRESENTACIONES/PPT SI01 MCUN.pptx
@@ -6,17 +6,18 @@
   </p:sldMasterIdLst>
   <p:sldIdLst>
     <p:sldId id="256" r:id="rId2"/>
-    <p:sldId id="258" r:id="rId3"/>
-    <p:sldId id="261" r:id="rId4"/>
-    <p:sldId id="262" r:id="rId5"/>
-    <p:sldId id="265" r:id="rId6"/>
-    <p:sldId id="263" r:id="rId7"/>
-    <p:sldId id="264" r:id="rId8"/>
-    <p:sldId id="266" r:id="rId9"/>
-    <p:sldId id="267" r:id="rId10"/>
-    <p:sldId id="268" r:id="rId11"/>
-    <p:sldId id="259" r:id="rId12"/>
-    <p:sldId id="260" r:id="rId13"/>
+    <p:sldId id="269" r:id="rId3"/>
+    <p:sldId id="258" r:id="rId4"/>
+    <p:sldId id="261" r:id="rId5"/>
+    <p:sldId id="262" r:id="rId6"/>
+    <p:sldId id="265" r:id="rId7"/>
+    <p:sldId id="263" r:id="rId8"/>
+    <p:sldId id="264" r:id="rId9"/>
+    <p:sldId id="266" r:id="rId10"/>
+    <p:sldId id="267" r:id="rId11"/>
+    <p:sldId id="268" r:id="rId12"/>
+    <p:sldId id="259" r:id="rId13"/>
+    <p:sldId id="260" r:id="rId14"/>
   </p:sldIdLst>
   <p:sldSz cx="9144000" cy="6858000" type="screen4x3"/>
   <p:notesSz cx="6858000" cy="9144000"/>
@@ -14756,7 +14757,7 @@
     </p:spTree>
     <p:extLst>
       <p:ext uri="{BB962C8B-B14F-4D97-AF65-F5344CB8AC3E}">
-        <p14:creationId xmlns:p14="http://schemas.microsoft.com/office/powerpoint/2010/main" xmlns="" val="3004352296"/>
+        <p14:creationId xmlns="" xmlns:p14="http://schemas.microsoft.com/office/powerpoint/2010/main" val="3004352296"/>
       </p:ext>
     </p:extLst>
   </p:cSld>
@@ -14774,6 +14775,491 @@
 </file>
 
 <file path=ppt/slides/slide10.xml><?xml version="1.0" encoding="utf-8"?>
+<p:sld xmlns:a="http://schemas.openxmlformats.org/drawingml/2006/main" xmlns:r="http://schemas.openxmlformats.org/officeDocument/2006/relationships" xmlns:p="http://schemas.openxmlformats.org/presentationml/2006/main">
+  <p:cSld>
+    <p:spTree>
+      <p:nvGrpSpPr>
+        <p:cNvPr id="1" name=""/>
+        <p:cNvGrpSpPr/>
+        <p:nvPr/>
+      </p:nvGrpSpPr>
+      <p:grpSpPr>
+        <a:xfrm>
+          <a:off x="0" y="0"/>
+          <a:ext cx="0" cy="0"/>
+          <a:chOff x="0" y="0"/>
+          <a:chExt cx="0" cy="0"/>
+        </a:xfrm>
+      </p:grpSpPr>
+      <p:sp>
+        <p:nvSpPr>
+          <p:cNvPr id="3" name="2 Título"/>
+          <p:cNvSpPr>
+            <a:spLocks noGrp="1"/>
+          </p:cNvSpPr>
+          <p:nvPr>
+            <p:ph type="title"/>
+          </p:nvPr>
+        </p:nvSpPr>
+        <p:spPr/>
+        <p:txBody>
+          <a:bodyPr>
+            <a:normAutofit fontScale="90000"/>
+          </a:bodyPr>
+          <a:lstStyle/>
+          <a:p>
+            <a:r>
+              <a:rPr lang="es-PE" dirty="0"/>
+              <a:t>ESPECIFICACION </a:t>
+            </a:r>
+            <a:r>
+              <a:rPr lang="es-PE" dirty="0" smtClean="0"/>
+              <a:t>DE </a:t>
+            </a:r>
+            <a:r>
+              <a:rPr lang="es-PE" dirty="0"/>
+              <a:t>REGLAS DE </a:t>
+            </a:r>
+            <a:r>
+              <a:rPr lang="es-PE" dirty="0" smtClean="0"/>
+              <a:t>NEGOCIO (cont..)</a:t>
+            </a:r>
+            <a:endParaRPr lang="es-PE" dirty="0"/>
+          </a:p>
+        </p:txBody>
+      </p:sp>
+      <p:graphicFrame>
+        <p:nvGraphicFramePr>
+          <p:cNvPr id="6" name="5 Tabla"/>
+          <p:cNvGraphicFramePr>
+            <a:graphicFrameLocks noGrp="1"/>
+          </p:cNvGraphicFramePr>
+          <p:nvPr/>
+        </p:nvGraphicFramePr>
+        <p:xfrm>
+          <a:off x="323528" y="2348881"/>
+          <a:ext cx="8568952" cy="4295292"/>
+        </p:xfrm>
+        <a:graphic>
+          <a:graphicData uri="http://schemas.openxmlformats.org/drawingml/2006/table">
+            <a:tbl>
+              <a:tblPr firstRow="1" bandRow="1">
+                <a:tableStyleId>{BC89EF96-8CEA-46FF-86C4-4CE0E7609802}</a:tableStyleId>
+              </a:tblPr>
+              <a:tblGrid>
+                <a:gridCol w="2427870"/>
+                <a:gridCol w="6141082"/>
+              </a:tblGrid>
+              <a:tr h="1121079">
+                <a:tc>
+                  <a:txBody>
+                    <a:bodyPr/>
+                    <a:lstStyle/>
+                    <a:p>
+                      <a:endParaRPr lang="es-ES" dirty="0"/>
+                    </a:p>
+                  </a:txBody>
+                  <a:tcPr/>
+                </a:tc>
+                <a:tc>
+                  <a:txBody>
+                    <a:bodyPr/>
+                    <a:lstStyle/>
+                    <a:p>
+                      <a:pPr marL="0" marR="0" indent="0" algn="just" defTabSz="914400" rtl="0" eaLnBrk="1" fontAlgn="auto" latinLnBrk="0" hangingPunct="1">
+                        <a:lnSpc>
+                          <a:spcPct val="100000"/>
+                        </a:lnSpc>
+                        <a:spcBef>
+                          <a:spcPts val="0"/>
+                        </a:spcBef>
+                        <a:spcAft>
+                          <a:spcPts val="0"/>
+                        </a:spcAft>
+                        <a:buClrTx/>
+                        <a:buSzTx/>
+                        <a:buFontTx/>
+                        <a:buNone/>
+                        <a:tabLst/>
+                        <a:defRPr/>
+                      </a:pPr>
+                      <a:r>
+                        <a:rPr lang="es-PE" sz="1800" b="0" kern="1200" dirty="0" smtClean="0">
+                          <a:solidFill>
+                            <a:schemeClr val="tx1"/>
+                          </a:solidFill>
+                          <a:latin typeface="+mn-lt"/>
+                          <a:ea typeface="+mn-ea"/>
+                          <a:cs typeface="+mn-cs"/>
+                        </a:rPr>
+                        <a:t>Según el tipo de contrato se determinarán comisiones evaluadoras para el cierre del contrato.</a:t>
+                      </a:r>
+                      <a:endParaRPr lang="es-ES" sz="1800" b="0" kern="1200" dirty="0" smtClean="0">
+                        <a:solidFill>
+                          <a:schemeClr val="tx1"/>
+                        </a:solidFill>
+                        <a:latin typeface="+mn-lt"/>
+                        <a:ea typeface="+mn-ea"/>
+                        <a:cs typeface="+mn-cs"/>
+                      </a:endParaRPr>
+                    </a:p>
+                  </a:txBody>
+                  <a:tcPr/>
+                </a:tc>
+              </a:tr>
+              <a:tr h="1690540">
+                <a:tc>
+                  <a:txBody>
+                    <a:bodyPr/>
+                    <a:lstStyle/>
+                    <a:p>
+                      <a:endParaRPr lang="es-ES" dirty="0"/>
+                    </a:p>
+                  </a:txBody>
+                  <a:tcPr/>
+                </a:tc>
+                <a:tc>
+                  <a:txBody>
+                    <a:bodyPr/>
+                    <a:lstStyle/>
+                    <a:p>
+                      <a:pPr algn="just"/>
+                      <a:r>
+                        <a:rPr lang="es-PE" sz="1800" kern="1200" dirty="0" smtClean="0">
+                          <a:solidFill>
+                            <a:schemeClr val="tx1"/>
+                          </a:solidFill>
+                          <a:latin typeface="+mn-lt"/>
+                          <a:ea typeface="+mn-ea"/>
+                          <a:cs typeface="+mn-cs"/>
+                        </a:rPr>
+                        <a:t>Se definen los siguientes Tipos de Contrato:</a:t>
+                      </a:r>
+                    </a:p>
+                    <a:p>
+                      <a:pPr algn="just"/>
+                      <a:endParaRPr lang="es-ES" sz="1800" kern="1200" dirty="0" smtClean="0">
+                        <a:solidFill>
+                          <a:schemeClr val="tx1"/>
+                        </a:solidFill>
+                        <a:latin typeface="+mn-lt"/>
+                        <a:ea typeface="+mn-ea"/>
+                        <a:cs typeface="+mn-cs"/>
+                      </a:endParaRPr>
+                    </a:p>
+                    <a:p>
+                      <a:pPr algn="just"/>
+                      <a:r>
+                        <a:rPr lang="es-PE" sz="1800" kern="1200" dirty="0" smtClean="0">
+                          <a:solidFill>
+                            <a:schemeClr val="tx1"/>
+                          </a:solidFill>
+                          <a:latin typeface="+mn-lt"/>
+                          <a:ea typeface="+mn-ea"/>
+                          <a:cs typeface="+mn-cs"/>
+                        </a:rPr>
+                        <a:t>Prestación de servicio sin suministro de repuestos, prestación de servicio con suministro de repuestos, servicio prestado, mantenimiento integral, mantenimiento preventivo, mantenimiento correctivo y </a:t>
+                      </a:r>
+                      <a:r>
+                        <a:rPr lang="es-PE" sz="1800" kern="1200" dirty="0" err="1" smtClean="0">
+                          <a:solidFill>
+                            <a:schemeClr val="tx1"/>
+                          </a:solidFill>
+                          <a:latin typeface="+mn-lt"/>
+                          <a:ea typeface="+mn-ea"/>
+                          <a:cs typeface="+mn-cs"/>
+                        </a:rPr>
+                        <a:t>outsourcing</a:t>
+                      </a:r>
+                      <a:r>
+                        <a:rPr lang="es-PE" sz="1800" kern="1200" dirty="0" smtClean="0">
+                          <a:solidFill>
+                            <a:schemeClr val="tx1"/>
+                          </a:solidFill>
+                          <a:latin typeface="+mn-lt"/>
+                          <a:ea typeface="+mn-ea"/>
+                          <a:cs typeface="+mn-cs"/>
+                        </a:rPr>
+                        <a:t>.</a:t>
+                      </a:r>
+                      <a:endParaRPr lang="es-ES" sz="1800" b="0" kern="1200" dirty="0" smtClean="0">
+                        <a:solidFill>
+                          <a:schemeClr val="tx1"/>
+                        </a:solidFill>
+                        <a:latin typeface="+mn-lt"/>
+                        <a:ea typeface="+mn-ea"/>
+                        <a:cs typeface="+mn-cs"/>
+                      </a:endParaRPr>
+                    </a:p>
+                  </a:txBody>
+                  <a:tcPr/>
+                </a:tc>
+              </a:tr>
+              <a:tr h="1436853">
+                <a:tc>
+                  <a:txBody>
+                    <a:bodyPr/>
+                    <a:lstStyle/>
+                    <a:p>
+                      <a:endParaRPr lang="es-ES" dirty="0"/>
+                    </a:p>
+                  </a:txBody>
+                  <a:tcPr/>
+                </a:tc>
+                <a:tc>
+                  <a:txBody>
+                    <a:bodyPr/>
+                    <a:lstStyle/>
+                    <a:p>
+                      <a:pPr marL="0" marR="0" indent="0" algn="just" defTabSz="914400" rtl="0" eaLnBrk="1" fontAlgn="auto" latinLnBrk="0" hangingPunct="1">
+                        <a:lnSpc>
+                          <a:spcPct val="100000"/>
+                        </a:lnSpc>
+                        <a:spcBef>
+                          <a:spcPts val="0"/>
+                        </a:spcBef>
+                        <a:spcAft>
+                          <a:spcPts val="0"/>
+                        </a:spcAft>
+                        <a:buClrTx/>
+                        <a:buSzTx/>
+                        <a:buFontTx/>
+                        <a:buNone/>
+                        <a:tabLst/>
+                        <a:defRPr/>
+                      </a:pPr>
+                      <a:endParaRPr lang="es-PE" sz="1800" kern="1200" dirty="0" smtClean="0">
+                        <a:solidFill>
+                          <a:schemeClr val="tx1"/>
+                        </a:solidFill>
+                        <a:latin typeface="+mn-lt"/>
+                        <a:ea typeface="+mn-ea"/>
+                        <a:cs typeface="+mn-cs"/>
+                      </a:endParaRPr>
+                    </a:p>
+                    <a:p>
+                      <a:pPr marL="0" marR="0" indent="0" algn="just" defTabSz="914400" rtl="0" eaLnBrk="1" fontAlgn="auto" latinLnBrk="0" hangingPunct="1">
+                        <a:lnSpc>
+                          <a:spcPct val="100000"/>
+                        </a:lnSpc>
+                        <a:spcBef>
+                          <a:spcPts val="0"/>
+                        </a:spcBef>
+                        <a:spcAft>
+                          <a:spcPts val="0"/>
+                        </a:spcAft>
+                        <a:buClrTx/>
+                        <a:buSzTx/>
+                        <a:buFontTx/>
+                        <a:buNone/>
+                        <a:tabLst/>
+                        <a:defRPr/>
+                      </a:pPr>
+                      <a:r>
+                        <a:rPr lang="es-PE" sz="1800" kern="1200" dirty="0" smtClean="0">
+                          <a:solidFill>
+                            <a:schemeClr val="tx1"/>
+                          </a:solidFill>
+                          <a:latin typeface="+mn-lt"/>
+                          <a:ea typeface="+mn-ea"/>
+                          <a:cs typeface="+mn-cs"/>
+                        </a:rPr>
+                        <a:t>Los Tipos de penalidades son los siguientes: </a:t>
+                      </a:r>
+                    </a:p>
+                    <a:p>
+                      <a:pPr marL="0" marR="0" indent="0" algn="just" defTabSz="914400" rtl="0" eaLnBrk="1" fontAlgn="auto" latinLnBrk="0" hangingPunct="1">
+                        <a:lnSpc>
+                          <a:spcPct val="100000"/>
+                        </a:lnSpc>
+                        <a:spcBef>
+                          <a:spcPts val="0"/>
+                        </a:spcBef>
+                        <a:spcAft>
+                          <a:spcPts val="0"/>
+                        </a:spcAft>
+                        <a:buClrTx/>
+                        <a:buSzTx/>
+                        <a:buFontTx/>
+                        <a:buNone/>
+                        <a:tabLst/>
+                        <a:defRPr/>
+                      </a:pPr>
+                      <a:r>
+                        <a:rPr lang="es-PE" sz="1800" kern="1200" dirty="0" smtClean="0">
+                          <a:solidFill>
+                            <a:schemeClr val="tx1"/>
+                          </a:solidFill>
+                          <a:latin typeface="+mn-lt"/>
+                          <a:ea typeface="+mn-ea"/>
+                          <a:cs typeface="+mn-cs"/>
+                        </a:rPr>
+                        <a:t>incumplimiento, deficiencia y confidencialidad.  </a:t>
+                      </a:r>
+                    </a:p>
+                    <a:p>
+                      <a:pPr marL="0" marR="0" indent="0" algn="just" defTabSz="914400" rtl="0" eaLnBrk="1" fontAlgn="auto" latinLnBrk="0" hangingPunct="1">
+                        <a:lnSpc>
+                          <a:spcPct val="100000"/>
+                        </a:lnSpc>
+                        <a:spcBef>
+                          <a:spcPts val="0"/>
+                        </a:spcBef>
+                        <a:spcAft>
+                          <a:spcPts val="0"/>
+                        </a:spcAft>
+                        <a:buClrTx/>
+                        <a:buSzTx/>
+                        <a:buFontTx/>
+                        <a:buNone/>
+                        <a:tabLst/>
+                        <a:defRPr/>
+                      </a:pPr>
+                      <a:r>
+                        <a:rPr lang="es-PE" sz="1800" kern="1200" dirty="0" smtClean="0">
+                          <a:solidFill>
+                            <a:schemeClr val="tx1"/>
+                          </a:solidFill>
+                          <a:latin typeface="+mn-lt"/>
+                          <a:ea typeface="+mn-ea"/>
+                          <a:cs typeface="+mn-cs"/>
+                        </a:rPr>
+                        <a:t>Las penalidades se determinarán según el tipo de contrato</a:t>
+                      </a:r>
+                      <a:endParaRPr lang="es-ES" sz="1800" b="0" kern="1200" dirty="0" smtClean="0">
+                        <a:solidFill>
+                          <a:schemeClr val="tx1"/>
+                        </a:solidFill>
+                        <a:latin typeface="+mn-lt"/>
+                        <a:ea typeface="+mn-ea"/>
+                        <a:cs typeface="+mn-cs"/>
+                      </a:endParaRPr>
+                    </a:p>
+                  </a:txBody>
+                  <a:tcPr/>
+                </a:tc>
+              </a:tr>
+            </a:tbl>
+          </a:graphicData>
+        </a:graphic>
+      </p:graphicFrame>
+      <p:pic>
+        <p:nvPicPr>
+          <p:cNvPr id="8194" name="Picture 2"/>
+          <p:cNvPicPr>
+            <a:picLocks noChangeAspect="1" noChangeArrowheads="1"/>
+          </p:cNvPicPr>
+          <p:nvPr/>
+        </p:nvPicPr>
+        <p:blipFill>
+          <a:blip r:embed="rId2" cstate="print"/>
+          <a:srcRect/>
+          <a:stretch>
+            <a:fillRect/>
+          </a:stretch>
+        </p:blipFill>
+        <p:spPr bwMode="auto">
+          <a:xfrm>
+            <a:off x="683568" y="2495550"/>
+            <a:ext cx="1714500" cy="933450"/>
+          </a:xfrm>
+          <a:prstGeom prst="rect">
+            <a:avLst/>
+          </a:prstGeom>
+          <a:noFill/>
+          <a:ln w="9525">
+            <a:noFill/>
+            <a:miter lim="800000"/>
+            <a:headEnd/>
+            <a:tailEnd/>
+          </a:ln>
+        </p:spPr>
+      </p:pic>
+      <p:pic>
+        <p:nvPicPr>
+          <p:cNvPr id="8195" name="Picture 3"/>
+          <p:cNvPicPr>
+            <a:picLocks noChangeAspect="1" noChangeArrowheads="1"/>
+          </p:cNvPicPr>
+          <p:nvPr/>
+        </p:nvPicPr>
+        <p:blipFill>
+          <a:blip r:embed="rId3" cstate="print"/>
+          <a:srcRect/>
+          <a:stretch>
+            <a:fillRect/>
+          </a:stretch>
+        </p:blipFill>
+        <p:spPr bwMode="auto">
+          <a:xfrm>
+            <a:off x="827584" y="3916660"/>
+            <a:ext cx="1409700" cy="952500"/>
+          </a:xfrm>
+          <a:prstGeom prst="rect">
+            <a:avLst/>
+          </a:prstGeom>
+          <a:noFill/>
+          <a:ln w="9525">
+            <a:noFill/>
+            <a:miter lim="800000"/>
+            <a:headEnd/>
+            <a:tailEnd/>
+          </a:ln>
+        </p:spPr>
+      </p:pic>
+      <p:pic>
+        <p:nvPicPr>
+          <p:cNvPr id="8196" name="Picture 4"/>
+          <p:cNvPicPr>
+            <a:picLocks noChangeAspect="1" noChangeArrowheads="1"/>
+          </p:cNvPicPr>
+          <p:nvPr/>
+        </p:nvPicPr>
+        <p:blipFill>
+          <a:blip r:embed="rId4" cstate="print"/>
+          <a:srcRect/>
+          <a:stretch>
+            <a:fillRect/>
+          </a:stretch>
+        </p:blipFill>
+        <p:spPr bwMode="auto">
+          <a:xfrm>
+            <a:off x="755576" y="5445224"/>
+            <a:ext cx="1476375" cy="933450"/>
+          </a:xfrm>
+          <a:prstGeom prst="rect">
+            <a:avLst/>
+          </a:prstGeom>
+          <a:noFill/>
+          <a:ln w="9525">
+            <a:noFill/>
+            <a:miter lim="800000"/>
+            <a:headEnd/>
+            <a:tailEnd/>
+          </a:ln>
+        </p:spPr>
+      </p:pic>
+    </p:spTree>
+    <p:extLst>
+      <p:ext uri="{BB962C8B-B14F-4D97-AF65-F5344CB8AC3E}">
+        <p14:creationId xmlns="" xmlns:p14="http://schemas.microsoft.com/office/powerpoint/2010/main" val="1314591319"/>
+      </p:ext>
+    </p:extLst>
+  </p:cSld>
+  <p:clrMapOvr>
+    <a:masterClrMapping/>
+  </p:clrMapOvr>
+  <p:timing>
+    <p:tnLst>
+      <p:par>
+        <p:cTn id="1" dur="indefinite" restart="never" nodeType="tmRoot"/>
+      </p:par>
+    </p:tnLst>
+  </p:timing>
+</p:sld>
+</file>
+
+<file path=ppt/slides/slide11.xml><?xml version="1.0" encoding="utf-8"?>
 <p:sld xmlns:a="http://schemas.openxmlformats.org/drawingml/2006/main" xmlns:r="http://schemas.openxmlformats.org/officeDocument/2006/relationships" xmlns:p="http://schemas.openxmlformats.org/presentationml/2006/main">
   <p:cSld>
     <p:spTree>
@@ -15057,7 +15543,7 @@
           <a:blip r:embed="rId2" cstate="print">
             <a:extLst>
               <a:ext uri="{28A0092B-C50C-407E-A947-70E740481C1C}">
-                <a14:useLocalDpi xmlns:a14="http://schemas.microsoft.com/office/drawing/2010/main" xmlns="" val="0"/>
+                <a14:useLocalDpi xmlns="" xmlns:a14="http://schemas.microsoft.com/office/drawing/2010/main" val="0"/>
               </a:ext>
             </a:extLst>
           </a:blip>
@@ -15081,14 +15567,14 @@
           <a:effectLst/>
           <a:extLst>
             <a:ext uri="{909E8E84-426E-40DD-AFC4-6F175D3DCCD1}">
-              <a14:hiddenFill xmlns:a14="http://schemas.microsoft.com/office/drawing/2010/main" xmlns="">
+              <a14:hiddenFill xmlns="" xmlns:a14="http://schemas.microsoft.com/office/drawing/2010/main">
                 <a:solidFill>
                   <a:schemeClr val="accent1"/>
                 </a:solidFill>
               </a14:hiddenFill>
             </a:ext>
             <a:ext uri="{91240B29-F687-4F45-9708-019B960494DF}">
-              <a14:hiddenLine xmlns:a14="http://schemas.microsoft.com/office/drawing/2010/main" xmlns="" w="9525">
+              <a14:hiddenLine xmlns="" xmlns:a14="http://schemas.microsoft.com/office/drawing/2010/main" w="9525">
                 <a:solidFill>
                   <a:schemeClr val="tx1"/>
                 </a:solidFill>
@@ -15098,7 +15584,7 @@
               </a14:hiddenLine>
             </a:ext>
             <a:ext uri="{AF507438-7753-43E0-B8FC-AC1667EBCBE1}">
-              <a14:hiddenEffects xmlns:a14="http://schemas.microsoft.com/office/drawing/2010/main" xmlns="">
+              <a14:hiddenEffects xmlns="" xmlns:a14="http://schemas.microsoft.com/office/drawing/2010/main">
                 <a:effectLst>
                   <a:outerShdw dist="35921" dir="2700000" algn="ctr" rotWithShape="0">
                     <a:schemeClr val="bg2"/>
@@ -15121,7 +15607,7 @@
           <a:blip r:embed="rId3" cstate="print">
             <a:extLst>
               <a:ext uri="{28A0092B-C50C-407E-A947-70E740481C1C}">
-                <a14:useLocalDpi xmlns:a14="http://schemas.microsoft.com/office/drawing/2010/main" xmlns="" val="0"/>
+                <a14:useLocalDpi xmlns="" xmlns:a14="http://schemas.microsoft.com/office/drawing/2010/main" val="0"/>
               </a:ext>
             </a:extLst>
           </a:blip>
@@ -15145,14 +15631,14 @@
           <a:effectLst/>
           <a:extLst>
             <a:ext uri="{909E8E84-426E-40DD-AFC4-6F175D3DCCD1}">
-              <a14:hiddenFill xmlns:a14="http://schemas.microsoft.com/office/drawing/2010/main" xmlns="">
+              <a14:hiddenFill xmlns="" xmlns:a14="http://schemas.microsoft.com/office/drawing/2010/main">
                 <a:solidFill>
                   <a:schemeClr val="accent1"/>
                 </a:solidFill>
               </a14:hiddenFill>
             </a:ext>
             <a:ext uri="{91240B29-F687-4F45-9708-019B960494DF}">
-              <a14:hiddenLine xmlns:a14="http://schemas.microsoft.com/office/drawing/2010/main" xmlns="" w="9525">
+              <a14:hiddenLine xmlns="" xmlns:a14="http://schemas.microsoft.com/office/drawing/2010/main" w="9525">
                 <a:solidFill>
                   <a:schemeClr val="tx1"/>
                 </a:solidFill>
@@ -15162,7 +15648,7 @@
               </a14:hiddenLine>
             </a:ext>
             <a:ext uri="{AF507438-7753-43E0-B8FC-AC1667EBCBE1}">
-              <a14:hiddenEffects xmlns:a14="http://schemas.microsoft.com/office/drawing/2010/main" xmlns="">
+              <a14:hiddenEffects xmlns="" xmlns:a14="http://schemas.microsoft.com/office/drawing/2010/main">
                 <a:effectLst>
                   <a:outerShdw dist="35921" dir="2700000" algn="ctr" rotWithShape="0">
                     <a:schemeClr val="bg2"/>
@@ -15185,7 +15671,7 @@
           <a:blip r:embed="rId4" cstate="print">
             <a:extLst>
               <a:ext uri="{28A0092B-C50C-407E-A947-70E740481C1C}">
-                <a14:useLocalDpi xmlns:a14="http://schemas.microsoft.com/office/drawing/2010/main" xmlns="" val="0"/>
+                <a14:useLocalDpi xmlns="" xmlns:a14="http://schemas.microsoft.com/office/drawing/2010/main" val="0"/>
               </a:ext>
             </a:extLst>
           </a:blip>
@@ -15209,14 +15695,14 @@
           <a:effectLst/>
           <a:extLst>
             <a:ext uri="{909E8E84-426E-40DD-AFC4-6F175D3DCCD1}">
-              <a14:hiddenFill xmlns:a14="http://schemas.microsoft.com/office/drawing/2010/main" xmlns="">
+              <a14:hiddenFill xmlns="" xmlns:a14="http://schemas.microsoft.com/office/drawing/2010/main">
                 <a:solidFill>
                   <a:schemeClr val="accent1"/>
                 </a:solidFill>
               </a14:hiddenFill>
             </a:ext>
             <a:ext uri="{91240B29-F687-4F45-9708-019B960494DF}">
-              <a14:hiddenLine xmlns:a14="http://schemas.microsoft.com/office/drawing/2010/main" xmlns="" w="9525">
+              <a14:hiddenLine xmlns="" xmlns:a14="http://schemas.microsoft.com/office/drawing/2010/main" w="9525">
                 <a:solidFill>
                   <a:schemeClr val="tx1"/>
                 </a:solidFill>
@@ -15226,7 +15712,7 @@
               </a14:hiddenLine>
             </a:ext>
             <a:ext uri="{AF507438-7753-43E0-B8FC-AC1667EBCBE1}">
-              <a14:hiddenEffects xmlns:a14="http://schemas.microsoft.com/office/drawing/2010/main" xmlns="">
+              <a14:hiddenEffects xmlns="" xmlns:a14="http://schemas.microsoft.com/office/drawing/2010/main">
                 <a:effectLst>
                   <a:outerShdw dist="35921" dir="2700000" algn="ctr" rotWithShape="0">
                     <a:schemeClr val="bg2"/>
@@ -15240,7 +15726,7 @@
     </p:spTree>
     <p:extLst>
       <p:ext uri="{BB962C8B-B14F-4D97-AF65-F5344CB8AC3E}">
-        <p14:creationId xmlns:p14="http://schemas.microsoft.com/office/powerpoint/2010/main" xmlns="" val="1786203861"/>
+        <p14:creationId xmlns="" xmlns:p14="http://schemas.microsoft.com/office/powerpoint/2010/main" val="1786203861"/>
       </p:ext>
     </p:extLst>
   </p:cSld>
@@ -15257,7 +15743,7 @@
 </p:sld>
 </file>
 
-<file path=ppt/slides/slide11.xml><?xml version="1.0" encoding="utf-8"?>
+<file path=ppt/slides/slide12.xml><?xml version="1.0" encoding="utf-8"?>
 <p:sld xmlns:a="http://schemas.openxmlformats.org/drawingml/2006/main" xmlns:r="http://schemas.openxmlformats.org/officeDocument/2006/relationships" xmlns:p="http://schemas.openxmlformats.org/presentationml/2006/main">
   <p:cSld>
     <p:spTree>
@@ -15334,7 +15820,7 @@
     </p:spTree>
     <p:extLst>
       <p:ext uri="{BB962C8B-B14F-4D97-AF65-F5344CB8AC3E}">
-        <p14:creationId xmlns:p14="http://schemas.microsoft.com/office/powerpoint/2010/main" xmlns="" val="2066947068"/>
+        <p14:creationId xmlns="" xmlns:p14="http://schemas.microsoft.com/office/powerpoint/2010/main" val="2066947068"/>
       </p:ext>
     </p:extLst>
   </p:cSld>
@@ -15351,7 +15837,7 @@
 </p:sld>
 </file>
 
-<file path=ppt/slides/slide12.xml><?xml version="1.0" encoding="utf-8"?>
+<file path=ppt/slides/slide13.xml><?xml version="1.0" encoding="utf-8"?>
 <p:sld xmlns:a="http://schemas.openxmlformats.org/drawingml/2006/main" xmlns:r="http://schemas.openxmlformats.org/officeDocument/2006/relationships" xmlns:p="http://schemas.openxmlformats.org/presentationml/2006/main">
   <p:cSld>
     <p:spTree>
@@ -15569,7 +16055,7 @@
     </p:spTree>
     <p:extLst>
       <p:ext uri="{BB962C8B-B14F-4D97-AF65-F5344CB8AC3E}">
-        <p14:creationId xmlns:p14="http://schemas.microsoft.com/office/powerpoint/2010/main" xmlns="" val="700369716"/>
+        <p14:creationId xmlns="" xmlns:p14="http://schemas.microsoft.com/office/powerpoint/2010/main" val="700369716"/>
       </p:ext>
     </p:extLst>
   </p:cSld>
@@ -15587,6 +16073,89 @@
 </file>
 
 <file path=ppt/slides/slide2.xml><?xml version="1.0" encoding="utf-8"?>
+<p:sld xmlns:a="http://schemas.openxmlformats.org/drawingml/2006/main" xmlns:r="http://schemas.openxmlformats.org/officeDocument/2006/relationships" xmlns:p="http://schemas.openxmlformats.org/presentationml/2006/main">
+  <p:cSld>
+    <p:spTree>
+      <p:nvGrpSpPr>
+        <p:cNvPr id="1" name=""/>
+        <p:cNvGrpSpPr/>
+        <p:nvPr/>
+      </p:nvGrpSpPr>
+      <p:grpSpPr>
+        <a:xfrm>
+          <a:off x="0" y="0"/>
+          <a:ext cx="0" cy="0"/>
+          <a:chOff x="0" y="0"/>
+          <a:chExt cx="0" cy="0"/>
+        </a:xfrm>
+      </p:grpSpPr>
+      <p:sp>
+        <p:nvSpPr>
+          <p:cNvPr id="3" name="2 Título"/>
+          <p:cNvSpPr>
+            <a:spLocks noGrp="1"/>
+          </p:cNvSpPr>
+          <p:nvPr>
+            <p:ph type="title"/>
+          </p:nvPr>
+        </p:nvSpPr>
+        <p:spPr/>
+        <p:txBody>
+          <a:bodyPr>
+            <a:normAutofit fontScale="90000"/>
+          </a:bodyPr>
+          <a:lstStyle/>
+          <a:p>
+            <a:r>
+              <a:rPr lang="es-PE" dirty="0" smtClean="0"/>
+              <a:t>Modelo de Casos de uso del negocio</a:t>
+            </a:r>
+            <a:endParaRPr lang="es-PE" dirty="0"/>
+          </a:p>
+        </p:txBody>
+      </p:sp>
+      <p:pic>
+        <p:nvPicPr>
+          <p:cNvPr id="1026" name="Picture 2"/>
+          <p:cNvPicPr>
+            <a:picLocks noChangeAspect="1" noChangeArrowheads="1"/>
+          </p:cNvPicPr>
+          <p:nvPr/>
+        </p:nvPicPr>
+        <p:blipFill>
+          <a:blip r:embed="rId2" cstate="print"/>
+          <a:srcRect/>
+          <a:stretch>
+            <a:fillRect/>
+          </a:stretch>
+        </p:blipFill>
+        <p:spPr bwMode="auto">
+          <a:xfrm>
+            <a:off x="2555776" y="1244174"/>
+            <a:ext cx="4248472" cy="5613826"/>
+          </a:xfrm>
+          <a:prstGeom prst="rect">
+            <a:avLst/>
+          </a:prstGeom>
+          <a:noFill/>
+          <a:ln w="9525">
+            <a:noFill/>
+            <a:miter lim="800000"/>
+            <a:headEnd/>
+            <a:tailEnd/>
+          </a:ln>
+          <a:effectLst/>
+        </p:spPr>
+      </p:pic>
+    </p:spTree>
+  </p:cSld>
+  <p:clrMapOvr>
+    <a:masterClrMapping/>
+  </p:clrMapOvr>
+</p:sld>
+</file>
+
+<file path=ppt/slides/slide3.xml><?xml version="1.0" encoding="utf-8"?>
 <p:sld xmlns:a="http://schemas.openxmlformats.org/drawingml/2006/main" xmlns:r="http://schemas.openxmlformats.org/officeDocument/2006/relationships" xmlns:p="http://schemas.openxmlformats.org/presentationml/2006/main">
   <p:cSld>
     <p:spTree>
@@ -16134,7 +16703,7 @@
     </p:spTree>
     <p:extLst>
       <p:ext uri="{BB962C8B-B14F-4D97-AF65-F5344CB8AC3E}">
-        <p14:creationId xmlns:p14="http://schemas.microsoft.com/office/powerpoint/2010/main" xmlns="" val="1314591319"/>
+        <p14:creationId xmlns="" xmlns:p14="http://schemas.microsoft.com/office/powerpoint/2010/main" val="1314591319"/>
       </p:ext>
     </p:extLst>
   </p:cSld>
@@ -16151,7 +16720,7 @@
 </p:sld>
 </file>
 
-<file path=ppt/slides/slide3.xml><?xml version="1.0" encoding="utf-8"?>
+<file path=ppt/slides/slide4.xml><?xml version="1.0" encoding="utf-8"?>
 <p:sld xmlns:a="http://schemas.openxmlformats.org/drawingml/2006/main" xmlns:r="http://schemas.openxmlformats.org/officeDocument/2006/relationships" xmlns:p="http://schemas.openxmlformats.org/presentationml/2006/main">
   <p:cSld>
     <p:spTree>
@@ -16787,7 +17356,7 @@
     </p:spTree>
     <p:extLst>
       <p:ext uri="{BB962C8B-B14F-4D97-AF65-F5344CB8AC3E}">
-        <p14:creationId xmlns:p14="http://schemas.microsoft.com/office/powerpoint/2010/main" xmlns="" val="1314591319"/>
+        <p14:creationId xmlns="" xmlns:p14="http://schemas.microsoft.com/office/powerpoint/2010/main" val="1314591319"/>
       </p:ext>
     </p:extLst>
   </p:cSld>
@@ -16804,7 +17373,7 @@
 </p:sld>
 </file>
 
-<file path=ppt/slides/slide4.xml><?xml version="1.0" encoding="utf-8"?>
+<file path=ppt/slides/slide5.xml><?xml version="1.0" encoding="utf-8"?>
 <p:sld xmlns:a="http://schemas.openxmlformats.org/drawingml/2006/main" xmlns:r="http://schemas.openxmlformats.org/officeDocument/2006/relationships" xmlns:p="http://schemas.openxmlformats.org/presentationml/2006/main">
   <p:cSld>
     <p:spTree>
@@ -17001,7 +17570,7 @@
     </p:spTree>
     <p:extLst>
       <p:ext uri="{BB962C8B-B14F-4D97-AF65-F5344CB8AC3E}">
-        <p14:creationId xmlns:p14="http://schemas.microsoft.com/office/powerpoint/2010/main" xmlns="" val="1314591319"/>
+        <p14:creationId xmlns="" xmlns:p14="http://schemas.microsoft.com/office/powerpoint/2010/main" val="1314591319"/>
       </p:ext>
     </p:extLst>
   </p:cSld>
@@ -17018,7 +17587,7 @@
 </p:sld>
 </file>
 
-<file path=ppt/slides/slide5.xml><?xml version="1.0" encoding="utf-8"?>
+<file path=ppt/slides/slide6.xml><?xml version="1.0" encoding="utf-8"?>
 <p:sld xmlns:a="http://schemas.openxmlformats.org/drawingml/2006/main" xmlns:r="http://schemas.openxmlformats.org/officeDocument/2006/relationships" xmlns:p="http://schemas.openxmlformats.org/presentationml/2006/main">
   <p:cSld>
     <p:spTree>
@@ -17182,23 +17751,21 @@
       </p:pic>
       <p:pic>
         <p:nvPicPr>
-          <p:cNvPr id="4099" name="Picture 3"/>
-          <p:cNvPicPr>
-            <a:picLocks noChangeAspect="1" noChangeArrowheads="1"/>
-          </p:cNvPicPr>
+          <p:cNvPr id="7" name="6 Imagen" descr="http://www.cdti.es/recursos/img/Servicios/Red_PIDi/Tutorial_BMP/Incentivos_N1/9323_1311312010115741.JPG"/>
+          <p:cNvPicPr/>
           <p:nvPr/>
         </p:nvPicPr>
         <p:blipFill>
           <a:blip r:embed="rId3" cstate="print"/>
-          <a:srcRect/>
+          <a:srcRect t="8000"/>
           <a:stretch>
             <a:fillRect/>
           </a:stretch>
         </p:blipFill>
         <p:spPr bwMode="auto">
           <a:xfrm>
-            <a:off x="2876377" y="3068960"/>
-            <a:ext cx="5944095" cy="2808312"/>
+            <a:off x="3995936" y="3212976"/>
+            <a:ext cx="2880320" cy="2880320"/>
           </a:xfrm>
           <a:prstGeom prst="rect">
             <a:avLst/>
@@ -17215,7 +17782,7 @@
     </p:spTree>
     <p:extLst>
       <p:ext uri="{BB962C8B-B14F-4D97-AF65-F5344CB8AC3E}">
-        <p14:creationId xmlns:p14="http://schemas.microsoft.com/office/powerpoint/2010/main" xmlns="" val="1314591319"/>
+        <p14:creationId xmlns="" xmlns:p14="http://schemas.microsoft.com/office/powerpoint/2010/main" val="1314591319"/>
       </p:ext>
     </p:extLst>
   </p:cSld>
@@ -17232,7 +17799,7 @@
 </p:sld>
 </file>
 
-<file path=ppt/slides/slide6.xml><?xml version="1.0" encoding="utf-8"?>
+<file path=ppt/slides/slide7.xml><?xml version="1.0" encoding="utf-8"?>
 <p:sld xmlns:a="http://schemas.openxmlformats.org/drawingml/2006/main" xmlns:r="http://schemas.openxmlformats.org/officeDocument/2006/relationships" xmlns:p="http://schemas.openxmlformats.org/presentationml/2006/main">
   <p:cSld>
     <p:spTree>
@@ -17663,7 +18230,7 @@
     </p:spTree>
     <p:extLst>
       <p:ext uri="{BB962C8B-B14F-4D97-AF65-F5344CB8AC3E}">
-        <p14:creationId xmlns:p14="http://schemas.microsoft.com/office/powerpoint/2010/main" xmlns="" val="1314591319"/>
+        <p14:creationId xmlns="" xmlns:p14="http://schemas.microsoft.com/office/powerpoint/2010/main" val="1314591319"/>
       </p:ext>
     </p:extLst>
   </p:cSld>
@@ -17680,7 +18247,7 @@
 </p:sld>
 </file>
 
-<file path=ppt/slides/slide7.xml><?xml version="1.0" encoding="utf-8"?>
+<file path=ppt/slides/slide8.xml><?xml version="1.0" encoding="utf-8"?>
 <p:sld xmlns:a="http://schemas.openxmlformats.org/drawingml/2006/main" xmlns:r="http://schemas.openxmlformats.org/officeDocument/2006/relationships" xmlns:p="http://schemas.openxmlformats.org/presentationml/2006/main">
   <p:cSld>
     <p:spTree>
@@ -17810,6 +18377,48 @@
                       </a:endParaRPr>
                     </a:p>
                     <a:p>
+                      <a:endParaRPr lang="es-ES" dirty="0" smtClean="0"/>
+                    </a:p>
+                    <a:p>
+                      <a:endParaRPr lang="es-ES" dirty="0" smtClean="0"/>
+                    </a:p>
+                    <a:p>
+                      <a:endParaRPr lang="es-ES" dirty="0" smtClean="0"/>
+                    </a:p>
+                    <a:p>
+                      <a:endParaRPr lang="es-ES" dirty="0" smtClean="0"/>
+                    </a:p>
+                    <a:p>
+                      <a:pPr marL="0" marR="0" indent="0" algn="l" defTabSz="914400" rtl="0" eaLnBrk="1" fontAlgn="auto" latinLnBrk="0" hangingPunct="1">
+                        <a:lnSpc>
+                          <a:spcPct val="100000"/>
+                        </a:lnSpc>
+                        <a:spcBef>
+                          <a:spcPts val="0"/>
+                        </a:spcBef>
+                        <a:spcAft>
+                          <a:spcPts val="0"/>
+                        </a:spcAft>
+                        <a:buClrTx/>
+                        <a:buSzTx/>
+                        <a:buFontTx/>
+                        <a:buNone/>
+                        <a:tabLst/>
+                        <a:defRPr/>
+                      </a:pPr>
+                      <a:r>
+                        <a:rPr lang="es-PE" sz="1800" b="1" kern="1200" smtClean="0">
+                          <a:solidFill>
+                            <a:schemeClr val="tx1"/>
+                          </a:solidFill>
+                          <a:latin typeface="+mn-lt"/>
+                          <a:ea typeface="+mn-ea"/>
+                          <a:cs typeface="+mn-cs"/>
+                        </a:rPr>
+                        <a:t>Total = Gastos Recursos + Gastos de equipos+ IGV</a:t>
+                      </a:r>
+                    </a:p>
+                    <a:p>
                       <a:endParaRPr lang="es-ES" dirty="0"/>
                     </a:p>
                   </a:txBody>
@@ -17852,42 +18461,10 @@
           </a:ln>
         </p:spPr>
       </p:pic>
-      <p:pic>
-        <p:nvPicPr>
-          <p:cNvPr id="6147" name="Picture 3"/>
-          <p:cNvPicPr>
-            <a:picLocks noChangeAspect="1" noChangeArrowheads="1"/>
-          </p:cNvPicPr>
-          <p:nvPr/>
-        </p:nvPicPr>
-        <p:blipFill>
-          <a:blip r:embed="rId3" cstate="print"/>
-          <a:srcRect/>
-          <a:stretch>
-            <a:fillRect/>
-          </a:stretch>
-        </p:blipFill>
-        <p:spPr bwMode="auto">
-          <a:xfrm>
-            <a:off x="2814905" y="2852936"/>
-            <a:ext cx="4637415" cy="3384376"/>
-          </a:xfrm>
-          <a:prstGeom prst="rect">
-            <a:avLst/>
-          </a:prstGeom>
-          <a:noFill/>
-          <a:ln w="9525">
-            <a:noFill/>
-            <a:miter lim="800000"/>
-            <a:headEnd/>
-            <a:tailEnd/>
-          </a:ln>
-        </p:spPr>
-      </p:pic>
     </p:spTree>
     <p:extLst>
       <p:ext uri="{BB962C8B-B14F-4D97-AF65-F5344CB8AC3E}">
-        <p14:creationId xmlns:p14="http://schemas.microsoft.com/office/powerpoint/2010/main" xmlns="" val="1314591319"/>
+        <p14:creationId xmlns="" xmlns:p14="http://schemas.microsoft.com/office/powerpoint/2010/main" val="1314591319"/>
       </p:ext>
     </p:extLst>
   </p:cSld>
@@ -17904,7 +18481,7 @@
 </p:sld>
 </file>
 
-<file path=ppt/slides/slide8.xml><?xml version="1.0" encoding="utf-8"?>
+<file path=ppt/slides/slide9.xml><?xml version="1.0" encoding="utf-8"?>
 <p:sld xmlns:a="http://schemas.openxmlformats.org/drawingml/2006/main" xmlns:r="http://schemas.openxmlformats.org/officeDocument/2006/relationships" xmlns:p="http://schemas.openxmlformats.org/presentationml/2006/main">
   <p:cSld>
     <p:spTree>
@@ -18335,492 +18912,7 @@
     </p:spTree>
     <p:extLst>
       <p:ext uri="{BB962C8B-B14F-4D97-AF65-F5344CB8AC3E}">
-        <p14:creationId xmlns:p14="http://schemas.microsoft.com/office/powerpoint/2010/main" xmlns="" val="1314591319"/>
-      </p:ext>
-    </p:extLst>
-  </p:cSld>
-  <p:clrMapOvr>
-    <a:masterClrMapping/>
-  </p:clrMapOvr>
-  <p:timing>
-    <p:tnLst>
-      <p:par>
-        <p:cTn id="1" dur="indefinite" restart="never" nodeType="tmRoot"/>
-      </p:par>
-    </p:tnLst>
-  </p:timing>
-</p:sld>
-</file>
-
-<file path=ppt/slides/slide9.xml><?xml version="1.0" encoding="utf-8"?>
-<p:sld xmlns:a="http://schemas.openxmlformats.org/drawingml/2006/main" xmlns:r="http://schemas.openxmlformats.org/officeDocument/2006/relationships" xmlns:p="http://schemas.openxmlformats.org/presentationml/2006/main">
-  <p:cSld>
-    <p:spTree>
-      <p:nvGrpSpPr>
-        <p:cNvPr id="1" name=""/>
-        <p:cNvGrpSpPr/>
-        <p:nvPr/>
-      </p:nvGrpSpPr>
-      <p:grpSpPr>
-        <a:xfrm>
-          <a:off x="0" y="0"/>
-          <a:ext cx="0" cy="0"/>
-          <a:chOff x="0" y="0"/>
-          <a:chExt cx="0" cy="0"/>
-        </a:xfrm>
-      </p:grpSpPr>
-      <p:sp>
-        <p:nvSpPr>
-          <p:cNvPr id="3" name="2 Título"/>
-          <p:cNvSpPr>
-            <a:spLocks noGrp="1"/>
-          </p:cNvSpPr>
-          <p:nvPr>
-            <p:ph type="title"/>
-          </p:nvPr>
-        </p:nvSpPr>
-        <p:spPr/>
-        <p:txBody>
-          <a:bodyPr>
-            <a:normAutofit fontScale="90000"/>
-          </a:bodyPr>
-          <a:lstStyle/>
-          <a:p>
-            <a:r>
-              <a:rPr lang="es-PE" dirty="0"/>
-              <a:t>ESPECIFICACION </a:t>
-            </a:r>
-            <a:r>
-              <a:rPr lang="es-PE" dirty="0" smtClean="0"/>
-              <a:t>DE </a:t>
-            </a:r>
-            <a:r>
-              <a:rPr lang="es-PE" dirty="0"/>
-              <a:t>REGLAS DE </a:t>
-            </a:r>
-            <a:r>
-              <a:rPr lang="es-PE" dirty="0" smtClean="0"/>
-              <a:t>NEGOCIO (cont..)</a:t>
-            </a:r>
-            <a:endParaRPr lang="es-PE" dirty="0"/>
-          </a:p>
-        </p:txBody>
-      </p:sp>
-      <p:graphicFrame>
-        <p:nvGraphicFramePr>
-          <p:cNvPr id="6" name="5 Tabla"/>
-          <p:cNvGraphicFramePr>
-            <a:graphicFrameLocks noGrp="1"/>
-          </p:cNvGraphicFramePr>
-          <p:nvPr/>
-        </p:nvGraphicFramePr>
-        <p:xfrm>
-          <a:off x="323528" y="2348881"/>
-          <a:ext cx="8568952" cy="4295292"/>
-        </p:xfrm>
-        <a:graphic>
-          <a:graphicData uri="http://schemas.openxmlformats.org/drawingml/2006/table">
-            <a:tbl>
-              <a:tblPr firstRow="1" bandRow="1">
-                <a:tableStyleId>{BC89EF96-8CEA-46FF-86C4-4CE0E7609802}</a:tableStyleId>
-              </a:tblPr>
-              <a:tblGrid>
-                <a:gridCol w="2427870"/>
-                <a:gridCol w="6141082"/>
-              </a:tblGrid>
-              <a:tr h="1121079">
-                <a:tc>
-                  <a:txBody>
-                    <a:bodyPr/>
-                    <a:lstStyle/>
-                    <a:p>
-                      <a:endParaRPr lang="es-ES" dirty="0"/>
-                    </a:p>
-                  </a:txBody>
-                  <a:tcPr/>
-                </a:tc>
-                <a:tc>
-                  <a:txBody>
-                    <a:bodyPr/>
-                    <a:lstStyle/>
-                    <a:p>
-                      <a:pPr marL="0" marR="0" indent="0" algn="just" defTabSz="914400" rtl="0" eaLnBrk="1" fontAlgn="auto" latinLnBrk="0" hangingPunct="1">
-                        <a:lnSpc>
-                          <a:spcPct val="100000"/>
-                        </a:lnSpc>
-                        <a:spcBef>
-                          <a:spcPts val="0"/>
-                        </a:spcBef>
-                        <a:spcAft>
-                          <a:spcPts val="0"/>
-                        </a:spcAft>
-                        <a:buClrTx/>
-                        <a:buSzTx/>
-                        <a:buFontTx/>
-                        <a:buNone/>
-                        <a:tabLst/>
-                        <a:defRPr/>
-                      </a:pPr>
-                      <a:r>
-                        <a:rPr lang="es-PE" sz="1800" b="0" kern="1200" dirty="0" smtClean="0">
-                          <a:solidFill>
-                            <a:schemeClr val="tx1"/>
-                          </a:solidFill>
-                          <a:latin typeface="+mn-lt"/>
-                          <a:ea typeface="+mn-ea"/>
-                          <a:cs typeface="+mn-cs"/>
-                        </a:rPr>
-                        <a:t>Según el tipo de contrato se determinarán comisiones evaluadoras para el cierre del contrato.</a:t>
-                      </a:r>
-                      <a:endParaRPr lang="es-ES" sz="1800" b="0" kern="1200" dirty="0" smtClean="0">
-                        <a:solidFill>
-                          <a:schemeClr val="tx1"/>
-                        </a:solidFill>
-                        <a:latin typeface="+mn-lt"/>
-                        <a:ea typeface="+mn-ea"/>
-                        <a:cs typeface="+mn-cs"/>
-                      </a:endParaRPr>
-                    </a:p>
-                  </a:txBody>
-                  <a:tcPr/>
-                </a:tc>
-              </a:tr>
-              <a:tr h="1690540">
-                <a:tc>
-                  <a:txBody>
-                    <a:bodyPr/>
-                    <a:lstStyle/>
-                    <a:p>
-                      <a:endParaRPr lang="es-ES" dirty="0"/>
-                    </a:p>
-                  </a:txBody>
-                  <a:tcPr/>
-                </a:tc>
-                <a:tc>
-                  <a:txBody>
-                    <a:bodyPr/>
-                    <a:lstStyle/>
-                    <a:p>
-                      <a:pPr algn="just"/>
-                      <a:r>
-                        <a:rPr lang="es-PE" sz="1800" kern="1200" dirty="0" smtClean="0">
-                          <a:solidFill>
-                            <a:schemeClr val="tx1"/>
-                          </a:solidFill>
-                          <a:latin typeface="+mn-lt"/>
-                          <a:ea typeface="+mn-ea"/>
-                          <a:cs typeface="+mn-cs"/>
-                        </a:rPr>
-                        <a:t>Se definen los siguientes Tipos de Contrato:</a:t>
-                      </a:r>
-                    </a:p>
-                    <a:p>
-                      <a:pPr algn="just"/>
-                      <a:endParaRPr lang="es-ES" sz="1800" kern="1200" dirty="0" smtClean="0">
-                        <a:solidFill>
-                          <a:schemeClr val="tx1"/>
-                        </a:solidFill>
-                        <a:latin typeface="+mn-lt"/>
-                        <a:ea typeface="+mn-ea"/>
-                        <a:cs typeface="+mn-cs"/>
-                      </a:endParaRPr>
-                    </a:p>
-                    <a:p>
-                      <a:pPr algn="just"/>
-                      <a:r>
-                        <a:rPr lang="es-PE" sz="1800" kern="1200" dirty="0" smtClean="0">
-                          <a:solidFill>
-                            <a:schemeClr val="tx1"/>
-                          </a:solidFill>
-                          <a:latin typeface="+mn-lt"/>
-                          <a:ea typeface="+mn-ea"/>
-                          <a:cs typeface="+mn-cs"/>
-                        </a:rPr>
-                        <a:t>Prestación de servicio sin suministro de repuestos, prestación de servicio con suministro de repuestos, servicio prestado, mantenimiento integral, mantenimiento preventivo, mantenimiento correctivo y </a:t>
-                      </a:r>
-                      <a:r>
-                        <a:rPr lang="es-PE" sz="1800" kern="1200" dirty="0" err="1" smtClean="0">
-                          <a:solidFill>
-                            <a:schemeClr val="tx1"/>
-                          </a:solidFill>
-                          <a:latin typeface="+mn-lt"/>
-                          <a:ea typeface="+mn-ea"/>
-                          <a:cs typeface="+mn-cs"/>
-                        </a:rPr>
-                        <a:t>outsourcing</a:t>
-                      </a:r>
-                      <a:r>
-                        <a:rPr lang="es-PE" sz="1800" kern="1200" dirty="0" smtClean="0">
-                          <a:solidFill>
-                            <a:schemeClr val="tx1"/>
-                          </a:solidFill>
-                          <a:latin typeface="+mn-lt"/>
-                          <a:ea typeface="+mn-ea"/>
-                          <a:cs typeface="+mn-cs"/>
-                        </a:rPr>
-                        <a:t>.</a:t>
-                      </a:r>
-                      <a:endParaRPr lang="es-ES" sz="1800" b="0" kern="1200" dirty="0" smtClean="0">
-                        <a:solidFill>
-                          <a:schemeClr val="tx1"/>
-                        </a:solidFill>
-                        <a:latin typeface="+mn-lt"/>
-                        <a:ea typeface="+mn-ea"/>
-                        <a:cs typeface="+mn-cs"/>
-                      </a:endParaRPr>
-                    </a:p>
-                  </a:txBody>
-                  <a:tcPr/>
-                </a:tc>
-              </a:tr>
-              <a:tr h="1436853">
-                <a:tc>
-                  <a:txBody>
-                    <a:bodyPr/>
-                    <a:lstStyle/>
-                    <a:p>
-                      <a:endParaRPr lang="es-ES" dirty="0"/>
-                    </a:p>
-                  </a:txBody>
-                  <a:tcPr/>
-                </a:tc>
-                <a:tc>
-                  <a:txBody>
-                    <a:bodyPr/>
-                    <a:lstStyle/>
-                    <a:p>
-                      <a:pPr marL="0" marR="0" indent="0" algn="just" defTabSz="914400" rtl="0" eaLnBrk="1" fontAlgn="auto" latinLnBrk="0" hangingPunct="1">
-                        <a:lnSpc>
-                          <a:spcPct val="100000"/>
-                        </a:lnSpc>
-                        <a:spcBef>
-                          <a:spcPts val="0"/>
-                        </a:spcBef>
-                        <a:spcAft>
-                          <a:spcPts val="0"/>
-                        </a:spcAft>
-                        <a:buClrTx/>
-                        <a:buSzTx/>
-                        <a:buFontTx/>
-                        <a:buNone/>
-                        <a:tabLst/>
-                        <a:defRPr/>
-                      </a:pPr>
-                      <a:endParaRPr lang="es-PE" sz="1800" kern="1200" dirty="0" smtClean="0">
-                        <a:solidFill>
-                          <a:schemeClr val="tx1"/>
-                        </a:solidFill>
-                        <a:latin typeface="+mn-lt"/>
-                        <a:ea typeface="+mn-ea"/>
-                        <a:cs typeface="+mn-cs"/>
-                      </a:endParaRPr>
-                    </a:p>
-                    <a:p>
-                      <a:pPr marL="0" marR="0" indent="0" algn="just" defTabSz="914400" rtl="0" eaLnBrk="1" fontAlgn="auto" latinLnBrk="0" hangingPunct="1">
-                        <a:lnSpc>
-                          <a:spcPct val="100000"/>
-                        </a:lnSpc>
-                        <a:spcBef>
-                          <a:spcPts val="0"/>
-                        </a:spcBef>
-                        <a:spcAft>
-                          <a:spcPts val="0"/>
-                        </a:spcAft>
-                        <a:buClrTx/>
-                        <a:buSzTx/>
-                        <a:buFontTx/>
-                        <a:buNone/>
-                        <a:tabLst/>
-                        <a:defRPr/>
-                      </a:pPr>
-                      <a:r>
-                        <a:rPr lang="es-PE" sz="1800" kern="1200" dirty="0" smtClean="0">
-                          <a:solidFill>
-                            <a:schemeClr val="tx1"/>
-                          </a:solidFill>
-                          <a:latin typeface="+mn-lt"/>
-                          <a:ea typeface="+mn-ea"/>
-                          <a:cs typeface="+mn-cs"/>
-                        </a:rPr>
-                        <a:t>Los Tipos de penalidades son los siguientes: </a:t>
-                      </a:r>
-                    </a:p>
-                    <a:p>
-                      <a:pPr marL="0" marR="0" indent="0" algn="just" defTabSz="914400" rtl="0" eaLnBrk="1" fontAlgn="auto" latinLnBrk="0" hangingPunct="1">
-                        <a:lnSpc>
-                          <a:spcPct val="100000"/>
-                        </a:lnSpc>
-                        <a:spcBef>
-                          <a:spcPts val="0"/>
-                        </a:spcBef>
-                        <a:spcAft>
-                          <a:spcPts val="0"/>
-                        </a:spcAft>
-                        <a:buClrTx/>
-                        <a:buSzTx/>
-                        <a:buFontTx/>
-                        <a:buNone/>
-                        <a:tabLst/>
-                        <a:defRPr/>
-                      </a:pPr>
-                      <a:r>
-                        <a:rPr lang="es-PE" sz="1800" kern="1200" dirty="0" smtClean="0">
-                          <a:solidFill>
-                            <a:schemeClr val="tx1"/>
-                          </a:solidFill>
-                          <a:latin typeface="+mn-lt"/>
-                          <a:ea typeface="+mn-ea"/>
-                          <a:cs typeface="+mn-cs"/>
-                        </a:rPr>
-                        <a:t>incumplimiento, deficiencia y confidencialidad.  </a:t>
-                      </a:r>
-                    </a:p>
-                    <a:p>
-                      <a:pPr marL="0" marR="0" indent="0" algn="just" defTabSz="914400" rtl="0" eaLnBrk="1" fontAlgn="auto" latinLnBrk="0" hangingPunct="1">
-                        <a:lnSpc>
-                          <a:spcPct val="100000"/>
-                        </a:lnSpc>
-                        <a:spcBef>
-                          <a:spcPts val="0"/>
-                        </a:spcBef>
-                        <a:spcAft>
-                          <a:spcPts val="0"/>
-                        </a:spcAft>
-                        <a:buClrTx/>
-                        <a:buSzTx/>
-                        <a:buFontTx/>
-                        <a:buNone/>
-                        <a:tabLst/>
-                        <a:defRPr/>
-                      </a:pPr>
-                      <a:r>
-                        <a:rPr lang="es-PE" sz="1800" kern="1200" dirty="0" smtClean="0">
-                          <a:solidFill>
-                            <a:schemeClr val="tx1"/>
-                          </a:solidFill>
-                          <a:latin typeface="+mn-lt"/>
-                          <a:ea typeface="+mn-ea"/>
-                          <a:cs typeface="+mn-cs"/>
-                        </a:rPr>
-                        <a:t>Las penalidades se determinarán según el tipo de contrato</a:t>
-                      </a:r>
-                      <a:endParaRPr lang="es-ES" sz="1800" b="0" kern="1200" dirty="0" smtClean="0">
-                        <a:solidFill>
-                          <a:schemeClr val="tx1"/>
-                        </a:solidFill>
-                        <a:latin typeface="+mn-lt"/>
-                        <a:ea typeface="+mn-ea"/>
-                        <a:cs typeface="+mn-cs"/>
-                      </a:endParaRPr>
-                    </a:p>
-                  </a:txBody>
-                  <a:tcPr/>
-                </a:tc>
-              </a:tr>
-            </a:tbl>
-          </a:graphicData>
-        </a:graphic>
-      </p:graphicFrame>
-      <p:pic>
-        <p:nvPicPr>
-          <p:cNvPr id="8194" name="Picture 2"/>
-          <p:cNvPicPr>
-            <a:picLocks noChangeAspect="1" noChangeArrowheads="1"/>
-          </p:cNvPicPr>
-          <p:nvPr/>
-        </p:nvPicPr>
-        <p:blipFill>
-          <a:blip r:embed="rId2" cstate="print"/>
-          <a:srcRect/>
-          <a:stretch>
-            <a:fillRect/>
-          </a:stretch>
-        </p:blipFill>
-        <p:spPr bwMode="auto">
-          <a:xfrm>
-            <a:off x="683568" y="2495550"/>
-            <a:ext cx="1714500" cy="933450"/>
-          </a:xfrm>
-          <a:prstGeom prst="rect">
-            <a:avLst/>
-          </a:prstGeom>
-          <a:noFill/>
-          <a:ln w="9525">
-            <a:noFill/>
-            <a:miter lim="800000"/>
-            <a:headEnd/>
-            <a:tailEnd/>
-          </a:ln>
-        </p:spPr>
-      </p:pic>
-      <p:pic>
-        <p:nvPicPr>
-          <p:cNvPr id="8195" name="Picture 3"/>
-          <p:cNvPicPr>
-            <a:picLocks noChangeAspect="1" noChangeArrowheads="1"/>
-          </p:cNvPicPr>
-          <p:nvPr/>
-        </p:nvPicPr>
-        <p:blipFill>
-          <a:blip r:embed="rId3" cstate="print"/>
-          <a:srcRect/>
-          <a:stretch>
-            <a:fillRect/>
-          </a:stretch>
-        </p:blipFill>
-        <p:spPr bwMode="auto">
-          <a:xfrm>
-            <a:off x="827584" y="3916660"/>
-            <a:ext cx="1409700" cy="952500"/>
-          </a:xfrm>
-          <a:prstGeom prst="rect">
-            <a:avLst/>
-          </a:prstGeom>
-          <a:noFill/>
-          <a:ln w="9525">
-            <a:noFill/>
-            <a:miter lim="800000"/>
-            <a:headEnd/>
-            <a:tailEnd/>
-          </a:ln>
-        </p:spPr>
-      </p:pic>
-      <p:pic>
-        <p:nvPicPr>
-          <p:cNvPr id="8196" name="Picture 4"/>
-          <p:cNvPicPr>
-            <a:picLocks noChangeAspect="1" noChangeArrowheads="1"/>
-          </p:cNvPicPr>
-          <p:nvPr/>
-        </p:nvPicPr>
-        <p:blipFill>
-          <a:blip r:embed="rId4" cstate="print"/>
-          <a:srcRect/>
-          <a:stretch>
-            <a:fillRect/>
-          </a:stretch>
-        </p:blipFill>
-        <p:spPr bwMode="auto">
-          <a:xfrm>
-            <a:off x="755576" y="5445224"/>
-            <a:ext cx="1476375" cy="933450"/>
-          </a:xfrm>
-          <a:prstGeom prst="rect">
-            <a:avLst/>
-          </a:prstGeom>
-          <a:noFill/>
-          <a:ln w="9525">
-            <a:noFill/>
-            <a:miter lim="800000"/>
-            <a:headEnd/>
-            <a:tailEnd/>
-          </a:ln>
-        </p:spPr>
-      </p:pic>
-    </p:spTree>
-    <p:extLst>
-      <p:ext uri="{BB962C8B-B14F-4D97-AF65-F5344CB8AC3E}">
-        <p14:creationId xmlns:p14="http://schemas.microsoft.com/office/powerpoint/2010/main" xmlns="" val="1314591319"/>
+        <p14:creationId xmlns="" xmlns:p14="http://schemas.microsoft.com/office/powerpoint/2010/main" val="1314591319"/>
       </p:ext>
     </p:extLst>
   </p:cSld>

</xml_diff>